<commit_message>
Update C elegans 2019 Poster.pptx
</commit_message>
<xml_diff>
--- a/static/img/C elegans 2019 Poster.pptx
+++ b/static/img/C elegans 2019 Poster.pptx
@@ -820,7 +820,7 @@
           <a:p>
             <a:fld id="{751E974B-4425-49ED-879F-3462A2B9D761}" type="datetimeFigureOut">
               <a:rPr lang="en-US" smtClean="0"/>
-              <a:t>6/17/2019</a:t>
+              <a:t>7/31/2020</a:t>
             </a:fld>
             <a:endParaRPr lang="en-US"/>
           </a:p>
@@ -983,7 +983,7 @@
           <a:p>
             <a:fld id="{751E974B-4425-49ED-879F-3462A2B9D761}" type="datetimeFigureOut">
               <a:rPr lang="en-US" smtClean="0"/>
-              <a:t>6/17/2019</a:t>
+              <a:t>7/31/2020</a:t>
             </a:fld>
             <a:endParaRPr lang="en-US"/>
           </a:p>
@@ -1156,7 +1156,7 @@
           <a:p>
             <a:fld id="{751E974B-4425-49ED-879F-3462A2B9D761}" type="datetimeFigureOut">
               <a:rPr lang="en-US" smtClean="0"/>
-              <a:t>6/17/2019</a:t>
+              <a:t>7/31/2020</a:t>
             </a:fld>
             <a:endParaRPr lang="en-US"/>
           </a:p>
@@ -1268,7 +1268,7 @@
           <a:p>
             <a:fld id="{751E974B-4425-49ED-879F-3462A2B9D761}" type="datetimeFigureOut">
               <a:rPr lang="en-US" smtClean="0"/>
-              <a:t>6/17/2019</a:t>
+              <a:t>7/31/2020</a:t>
             </a:fld>
             <a:endParaRPr lang="en-US"/>
           </a:p>
@@ -1431,7 +1431,7 @@
           <a:p>
             <a:fld id="{751E974B-4425-49ED-879F-3462A2B9D761}" type="datetimeFigureOut">
               <a:rPr lang="en-US" smtClean="0"/>
-              <a:t>6/17/2019</a:t>
+              <a:t>7/31/2020</a:t>
             </a:fld>
             <a:endParaRPr lang="en-US"/>
           </a:p>
@@ -1671,7 +1671,7 @@
           <a:p>
             <a:fld id="{751E974B-4425-49ED-879F-3462A2B9D761}" type="datetimeFigureOut">
               <a:rPr lang="en-US" smtClean="0"/>
-              <a:t>6/17/2019</a:t>
+              <a:t>7/31/2020</a:t>
             </a:fld>
             <a:endParaRPr lang="en-US"/>
           </a:p>
@@ -1951,7 +1951,7 @@
           <a:p>
             <a:fld id="{751E974B-4425-49ED-879F-3462A2B9D761}" type="datetimeFigureOut">
               <a:rPr lang="en-US" smtClean="0"/>
-              <a:t>6/17/2019</a:t>
+              <a:t>7/31/2020</a:t>
             </a:fld>
             <a:endParaRPr lang="en-US"/>
           </a:p>
@@ -2365,7 +2365,7 @@
           <a:p>
             <a:fld id="{751E974B-4425-49ED-879F-3462A2B9D761}" type="datetimeFigureOut">
               <a:rPr lang="en-US" smtClean="0"/>
-              <a:t>6/17/2019</a:t>
+              <a:t>7/31/2020</a:t>
             </a:fld>
             <a:endParaRPr lang="en-US"/>
           </a:p>
@@ -2477,7 +2477,7 @@
           <a:p>
             <a:fld id="{751E974B-4425-49ED-879F-3462A2B9D761}" type="datetimeFigureOut">
               <a:rPr lang="en-US" smtClean="0"/>
-              <a:t>6/17/2019</a:t>
+              <a:t>7/31/2020</a:t>
             </a:fld>
             <a:endParaRPr lang="en-US"/>
           </a:p>
@@ -2567,7 +2567,7 @@
           <a:p>
             <a:fld id="{751E974B-4425-49ED-879F-3462A2B9D761}" type="datetimeFigureOut">
               <a:rPr lang="en-US" smtClean="0"/>
-              <a:t>6/17/2019</a:t>
+              <a:t>7/31/2020</a:t>
             </a:fld>
             <a:endParaRPr lang="en-US"/>
           </a:p>
@@ -2837,7 +2837,7 @@
           <a:p>
             <a:fld id="{751E974B-4425-49ED-879F-3462A2B9D761}" type="datetimeFigureOut">
               <a:rPr lang="en-US" smtClean="0"/>
-              <a:t>6/17/2019</a:t>
+              <a:t>7/31/2020</a:t>
             </a:fld>
             <a:endParaRPr lang="en-US"/>
           </a:p>
@@ -3084,7 +3084,7 @@
           <a:p>
             <a:fld id="{751E974B-4425-49ED-879F-3462A2B9D761}" type="datetimeFigureOut">
               <a:rPr lang="en-US" smtClean="0"/>
-              <a:t>6/17/2019</a:t>
+              <a:t>7/31/2020</a:t>
             </a:fld>
             <a:endParaRPr lang="en-US"/>
           </a:p>
@@ -3295,7 +3295,7 @@
           <a:p>
             <a:fld id="{751E974B-4425-49ED-879F-3462A2B9D761}" type="datetimeFigureOut">
               <a:rPr lang="en-US" smtClean="0"/>
-              <a:t>6/17/2019</a:t>
+              <a:t>7/31/2020</a:t>
             </a:fld>
             <a:endParaRPr lang="en-US"/>
           </a:p>
@@ -5238,7 +5238,7 @@
           <a:graphicData uri="http://schemas.openxmlformats.org/presentationml/2006/ole">
             <mc:AlternateContent xmlns:mc="http://schemas.openxmlformats.org/markup-compatibility/2006">
               <mc:Choice xmlns:v="urn:schemas-microsoft-com:vml" Requires="v">
-                <p:oleObj spid="_x0000_s43986" name="Prism 8" r:id="rId4" imgW="5205041" imgH="2982075" progId="Prism8.Document">
+                <p:oleObj spid="_x0000_s43995" name="Prism 8" r:id="rId4" imgW="5205041" imgH="2982075" progId="Prism8.Document">
                   <p:embed/>
                 </p:oleObj>
               </mc:Choice>
@@ -5301,7 +5301,7 @@
           <a:graphicData uri="http://schemas.openxmlformats.org/presentationml/2006/ole">
             <mc:AlternateContent xmlns:mc="http://schemas.openxmlformats.org/markup-compatibility/2006">
               <mc:Choice xmlns:v="urn:schemas-microsoft-com:vml" Requires="v">
-                <p:oleObj spid="_x0000_s43987" name="Prism 8" r:id="rId6" imgW="3846610" imgH="2982075" progId="Prism8.Document">
+                <p:oleObj spid="_x0000_s43996" name="Prism 8" r:id="rId6" imgW="3846610" imgH="2982075" progId="Prism8.Document">
                   <p:embed/>
                 </p:oleObj>
               </mc:Choice>
@@ -5364,7 +5364,7 @@
           <a:graphicData uri="http://schemas.openxmlformats.org/presentationml/2006/ole">
             <mc:AlternateContent xmlns:mc="http://schemas.openxmlformats.org/markup-compatibility/2006">
               <mc:Choice xmlns:v="urn:schemas-microsoft-com:vml" Requires="v">
-                <p:oleObj spid="_x0000_s43988" name="Prism 8" r:id="rId8" imgW="3841928" imgH="2982075" progId="Prism8.Document">
+                <p:oleObj spid="_x0000_s43997" name="Prism 8" r:id="rId8" imgW="3841928" imgH="2982075" progId="Prism8.Document">
                   <p:embed/>
                 </p:oleObj>
               </mc:Choice>
@@ -5427,7 +5427,7 @@
           <a:graphicData uri="http://schemas.openxmlformats.org/presentationml/2006/ole">
             <mc:AlternateContent xmlns:mc="http://schemas.openxmlformats.org/markup-compatibility/2006">
               <mc:Choice xmlns:v="urn:schemas-microsoft-com:vml" Requires="v">
-                <p:oleObj spid="_x0000_s43989" name="Prism 8" r:id="rId10" imgW="4656195" imgH="2982075" progId="Prism8.Document">
+                <p:oleObj spid="_x0000_s43998" name="Prism 8" r:id="rId10" imgW="4656195" imgH="2982075" progId="Prism8.Document">
                   <p:embed/>
                 </p:oleObj>
               </mc:Choice>
@@ -5490,7 +5490,7 @@
           <a:graphicData uri="http://schemas.openxmlformats.org/presentationml/2006/ole">
             <mc:AlternateContent xmlns:mc="http://schemas.openxmlformats.org/markup-compatibility/2006">
               <mc:Choice xmlns:v="urn:schemas-microsoft-com:vml" Requires="v">
-                <p:oleObj spid="_x0000_s43990" name="Prism 8" r:id="rId12" imgW="2617827" imgH="3575249" progId="Prism8.Document">
+                <p:oleObj spid="_x0000_s43999" name="Prism 8" r:id="rId12" imgW="2617827" imgH="3575249" progId="Prism8.Document">
                   <p:embed/>
                 </p:oleObj>
               </mc:Choice>
@@ -5553,7 +5553,7 @@
           <a:graphicData uri="http://schemas.openxmlformats.org/presentationml/2006/ole">
             <mc:AlternateContent xmlns:mc="http://schemas.openxmlformats.org/markup-compatibility/2006">
               <mc:Choice xmlns:v="urn:schemas-microsoft-com:vml" Requires="v">
-                <p:oleObj spid="_x0000_s43991" name="Prism 8" r:id="rId14" imgW="3073398" imgH="3881740" progId="Prism8.Document">
+                <p:oleObj spid="_x0000_s44000" name="Prism 8" r:id="rId14" imgW="3073398" imgH="3881740" progId="Prism8.Document">
                   <p:embed/>
                 </p:oleObj>
               </mc:Choice>
@@ -5616,7 +5616,7 @@
           <a:graphicData uri="http://schemas.openxmlformats.org/presentationml/2006/ole">
             <mc:AlternateContent xmlns:mc="http://schemas.openxmlformats.org/markup-compatibility/2006">
               <mc:Choice xmlns:v="urn:schemas-microsoft-com:vml" Requires="v">
-                <p:oleObj spid="_x0000_s43992" name="Prism 8" r:id="rId16" imgW="3050710" imgH="4340576" progId="Prism8.Document">
+                <p:oleObj spid="_x0000_s44001" name="Prism 8" r:id="rId16" imgW="3050710" imgH="4340576" progId="Prism8.Document">
                   <p:embed/>
                 </p:oleObj>
               </mc:Choice>
@@ -5699,7 +5699,7 @@
             <a:graphicData uri="http://schemas.openxmlformats.org/presentationml/2006/ole">
               <mc:AlternateContent xmlns:mc="http://schemas.openxmlformats.org/markup-compatibility/2006">
                 <mc:Choice xmlns:v="urn:schemas-microsoft-com:vml" Requires="v">
-                  <p:oleObj spid="_x0000_s43993" name="Prism 8" r:id="rId18" imgW="3316130" imgH="3027815" progId="Prism8.Document">
+                  <p:oleObj spid="_x0000_s44002" name="Prism 8" r:id="rId18" imgW="3316130" imgH="3027815" progId="Prism8.Document">
                     <p:embed/>
                   </p:oleObj>
                 </mc:Choice>
@@ -17370,7 +17370,7 @@
           <a:graphicData uri="http://schemas.openxmlformats.org/presentationml/2006/ole">
             <mc:AlternateContent xmlns:mc="http://schemas.openxmlformats.org/markup-compatibility/2006">
               <mc:Choice xmlns:v="urn:schemas-microsoft-com:vml" Requires="v">
-                <p:oleObj spid="_x0000_s43994" name="Prism 8" r:id="rId22" imgW="2846513" imgH="3538874" progId="Prism8.Document">
+                <p:oleObj spid="_x0000_s44003" name="Prism 8" r:id="rId22" imgW="2846513" imgH="3538874" progId="Prism8.Document">
                   <p:embed/>
                 </p:oleObj>
               </mc:Choice>

</xml_diff>